<commit_message>
add titles for projects and assignments
</commit_message>
<xml_diff>
--- a/Lab/课程总体要求.pptx
+++ b/Lab/课程总体要求.pptx
@@ -3190,12 +3190,12 @@
               </a:lnSpc>
             </a:pPr>
             <a:r>
-              <a:rPr kumimoji="1" lang="zh-CN" altLang="en-US" sz="1800" dirty="0"/>
-              <a:t>五次到六次</a:t>
-            </a:r>
-            <a:r>
               <a:rPr kumimoji="1" lang="en-US" altLang="zh-CN" sz="1800" dirty="0"/>
               <a:t>Project/Assignment</a:t>
+            </a:r>
+            <a:r>
+              <a:rPr kumimoji="1" lang="zh-CN" altLang="en-US" sz="1800" dirty="0"/>
+              <a:t>总共五次</a:t>
             </a:r>
             <a:endParaRPr kumimoji="1" lang="en-US" altLang="zh-CN" sz="1800" dirty="0"/>
           </a:p>
@@ -3307,7 +3307,13 @@
               <a:rPr kumimoji="1" lang="zh-CN" altLang="en-US" sz="1800" dirty="0">
                 <a:sym typeface="+mn-ea"/>
               </a:rPr>
-              <a:t>：待定</a:t>
+              <a:t>：</a:t>
+            </a:r>
+            <a:r>
+              <a:rPr kumimoji="1" lang="zh-CN" altLang="en-US" sz="1800" dirty="0">
+                <a:sym typeface="+mn-ea"/>
+              </a:rPr>
+              <a:t>启发式搜索算法</a:t>
             </a:r>
             <a:endParaRPr kumimoji="1" lang="en-US" altLang="zh-CN" sz="1800" dirty="0"/>
           </a:p>
@@ -3327,7 +3333,7 @@
               <a:rPr kumimoji="1" lang="zh-CN" altLang="en-US" sz="1800" dirty="0">
                 <a:sym typeface="+mn-ea"/>
               </a:rPr>
-              <a:t>：待定</a:t>
+              <a:t>：知识推理</a:t>
             </a:r>
             <a:endParaRPr kumimoji="1" lang="en-US" altLang="zh-CN" sz="1800" dirty="0"/>
           </a:p>
@@ -3341,25 +3347,13 @@
               <a:rPr kumimoji="1" lang="en-US" altLang="zh-CN" sz="1800" dirty="0">
                 <a:sym typeface="+mn-ea"/>
               </a:rPr>
-              <a:t>Project</a:t>
+              <a:t>Assignment3</a:t>
             </a:r>
             <a:r>
               <a:rPr kumimoji="1" lang="zh-CN" altLang="en-US" sz="1800" dirty="0">
                 <a:sym typeface="+mn-ea"/>
               </a:rPr>
-              <a:t> </a:t>
-            </a:r>
-            <a:r>
-              <a:rPr kumimoji="1" lang="en-US" altLang="zh-CN" sz="1800" dirty="0">
-                <a:sym typeface="+mn-ea"/>
-              </a:rPr>
-              <a:t>2</a:t>
-            </a:r>
-            <a:r>
-              <a:rPr kumimoji="1" lang="zh-CN" altLang="en-US" sz="1800" dirty="0">
-                <a:sym typeface="+mn-ea"/>
-              </a:rPr>
-              <a:t>：待定</a:t>
+              <a:t>：不确定性推理与贝叶斯</a:t>
             </a:r>
             <a:endParaRPr kumimoji="1" lang="en-US" altLang="zh-CN" sz="1800" dirty="0"/>
           </a:p>
@@ -3385,35 +3379,39 @@
               <a:rPr kumimoji="1" lang="en-US" altLang="zh-CN" sz="1800" dirty="0">
                 <a:sym typeface="+mn-ea"/>
               </a:rPr>
-              <a:t>3</a:t>
+              <a:t>2</a:t>
             </a:r>
             <a:r>
               <a:rPr kumimoji="1" lang="zh-CN" altLang="en-US" sz="1800" dirty="0">
                 <a:sym typeface="+mn-ea"/>
               </a:rPr>
-              <a:t>：待定</a:t>
-            </a:r>
-            <a:endParaRPr kumimoji="1" lang="zh-CN" altLang="en-US" sz="1800" dirty="0"/>
-          </a:p>
-          <a:p>
-            <a:pPr lvl="1">
-              <a:lnSpc>
-                <a:spcPct val="110000"/>
-              </a:lnSpc>
-            </a:pPr>
+              <a:t>：</a:t>
+            </a:r>
             <a:r>
               <a:rPr kumimoji="1" lang="en-US" altLang="zh-CN" sz="1800" dirty="0">
                 <a:sym typeface="+mn-ea"/>
               </a:rPr>
-              <a:t>Project Final</a:t>
+              <a:t>Aimbot </a:t>
             </a:r>
             <a:r>
               <a:rPr kumimoji="1" lang="zh-CN" altLang="en-US" sz="1800" dirty="0">
                 <a:sym typeface="+mn-ea"/>
               </a:rPr>
-              <a:t>：待定</a:t>
-            </a:r>
-            <a:endParaRPr kumimoji="1" lang="zh-CN" altLang="en-US" sz="1600" dirty="0"/>
+              <a:t>或</a:t>
+            </a:r>
+            <a:r>
+              <a:rPr kumimoji="1" lang="en-US" altLang="zh-CN" sz="1800" dirty="0">
+                <a:sym typeface="+mn-ea"/>
+              </a:rPr>
+              <a:t> </a:t>
+            </a:r>
+            <a:r>
+              <a:rPr kumimoji="1" lang="zh-CN" altLang="en-US" sz="1800" dirty="0">
+                <a:sym typeface="+mn-ea"/>
+              </a:rPr>
+              <a:t>自选</a:t>
+            </a:r>
+            <a:endParaRPr kumimoji="1" lang="zh-CN" altLang="en-US" sz="1800" dirty="0"/>
           </a:p>
           <a:p>
             <a:pPr>

</xml_diff>